<commit_message>
Terminado slide de concorrencia
</commit_message>
<xml_diff>
--- a/pitch/pitch-next.pptx
+++ b/pitch/pitch-next.pptx
@@ -6,13 +6,11 @@
   </p:sldMasterIdLst>
   <p:sldIdLst>
     <p:sldId id="342" r:id="rId2"/>
-    <p:sldId id="333" r:id="rId3"/>
-    <p:sldId id="351" r:id="rId4"/>
-    <p:sldId id="352" r:id="rId5"/>
-    <p:sldId id="343" r:id="rId6"/>
-    <p:sldId id="340" r:id="rId7"/>
-    <p:sldId id="346" r:id="rId8"/>
-    <p:sldId id="347" r:id="rId9"/>
+    <p:sldId id="351" r:id="rId3"/>
+    <p:sldId id="352" r:id="rId4"/>
+    <p:sldId id="340" r:id="rId5"/>
+    <p:sldId id="353" r:id="rId6"/>
+    <p:sldId id="347" r:id="rId7"/>
   </p:sldIdLst>
   <p:sldSz cx="12192000" cy="6858000"/>
   <p:notesSz cx="6858000" cy="9144000"/>
@@ -4824,277 +4822,6 @@
         <p:spPr>
           <a:xfrm>
             <a:off x="512561" y="406800"/>
-            <a:ext cx="4315360" cy="461665"/>
-          </a:xfrm>
-          <a:prstGeom prst="rect">
-            <a:avLst/>
-          </a:prstGeom>
-          <a:noFill/>
-        </p:spPr>
-        <p:txBody>
-          <a:bodyPr wrap="square" rtlCol="0">
-            <a:spAutoFit/>
-          </a:bodyPr>
-          <a:lstStyle/>
-          <a:p>
-            <a:r>
-              <a:rPr lang="pt-BR" sz="2400" spc="600" dirty="0">
-                <a:solidFill>
-                  <a:schemeClr val="bg1">
-                    <a:lumMod val="65000"/>
-                  </a:schemeClr>
-                </a:solidFill>
-                <a:latin typeface="Agency FB" panose="020B0503020202020204" pitchFamily="34" charset="0"/>
-                <a:ea typeface="Batang" panose="02030600000101010101" pitchFamily="18" charset="-127"/>
-              </a:rPr>
-              <a:t>PROBLEMA</a:t>
-            </a:r>
-          </a:p>
-        </p:txBody>
-      </p:sp>
-      <p:pic>
-        <p:nvPicPr>
-          <p:cNvPr id="5" name="Imagem 4">
-            <a:extLst>
-              <a:ext uri="{FF2B5EF4-FFF2-40B4-BE49-F238E27FC236}">
-                <a16:creationId xmlns:a16="http://schemas.microsoft.com/office/drawing/2014/main" id="{BB0A6787-3AD8-46A0-920A-BEC272CD647C}"/>
-              </a:ext>
-            </a:extLst>
-          </p:cNvPr>
-          <p:cNvPicPr>
-            <a:picLocks noChangeAspect="1"/>
-          </p:cNvPicPr>
-          <p:nvPr/>
-        </p:nvPicPr>
-        <p:blipFill>
-          <a:blip r:embed="rId2" cstate="print">
-            <a:extLst>
-              <a:ext uri="{28A0092B-C50C-407E-A947-70E740481C1C}">
-                <a14:useLocalDpi xmlns:a14="http://schemas.microsoft.com/office/drawing/2010/main" val="0"/>
-              </a:ext>
-            </a:extLst>
-          </a:blip>
-          <a:stretch>
-            <a:fillRect/>
-          </a:stretch>
-        </p:blipFill>
-        <p:spPr>
-          <a:xfrm>
-            <a:off x="11703860" y="6391392"/>
-            <a:ext cx="366488" cy="366488"/>
-          </a:xfrm>
-          <a:prstGeom prst="rect">
-            <a:avLst/>
-          </a:prstGeom>
-        </p:spPr>
-      </p:pic>
-      <p:sp>
-        <p:nvSpPr>
-          <p:cNvPr id="6" name="Arredondar Retângulo em um Canto Diagonal 53">
-            <a:extLst>
-              <a:ext uri="{FF2B5EF4-FFF2-40B4-BE49-F238E27FC236}">
-                <a16:creationId xmlns:a16="http://schemas.microsoft.com/office/drawing/2014/main" id="{737288A4-C4D9-42D1-AFEE-69604EB63A24}"/>
-              </a:ext>
-            </a:extLst>
-          </p:cNvPr>
-          <p:cNvSpPr/>
-          <p:nvPr/>
-        </p:nvSpPr>
-        <p:spPr>
-          <a:xfrm flipV="1">
-            <a:off x="602012" y="1019777"/>
-            <a:ext cx="10808110" cy="36000"/>
-          </a:xfrm>
-          <a:prstGeom prst="round2DiagRect">
-            <a:avLst/>
-          </a:prstGeom>
-          <a:gradFill flip="none" rotWithShape="1">
-            <a:gsLst>
-              <a:gs pos="0">
-                <a:srgbClr val="6C5CE7"/>
-              </a:gs>
-              <a:gs pos="100000">
-                <a:srgbClr val="81ECEC"/>
-              </a:gs>
-            </a:gsLst>
-            <a:path path="circle">
-              <a:fillToRect l="100000" t="100000"/>
-            </a:path>
-            <a:tileRect r="-100000" b="-100000"/>
-          </a:gradFill>
-          <a:ln>
-            <a:noFill/>
-          </a:ln>
-        </p:spPr>
-        <p:style>
-          <a:lnRef idx="2">
-            <a:schemeClr val="accent1">
-              <a:shade val="50000"/>
-            </a:schemeClr>
-          </a:lnRef>
-          <a:fillRef idx="1">
-            <a:schemeClr val="accent1"/>
-          </a:fillRef>
-          <a:effectRef idx="0">
-            <a:schemeClr val="accent1"/>
-          </a:effectRef>
-          <a:fontRef idx="minor">
-            <a:schemeClr val="lt1"/>
-          </a:fontRef>
-        </p:style>
-        <p:txBody>
-          <a:bodyPr rtlCol="0" anchor="ctr"/>
-          <a:lstStyle/>
-          <a:p>
-            <a:pPr algn="ctr"/>
-            <a:endParaRPr lang="pt-BR" dirty="0"/>
-          </a:p>
-        </p:txBody>
-      </p:sp>
-      <p:pic>
-        <p:nvPicPr>
-          <p:cNvPr id="7" name="Imagem 6"/>
-          <p:cNvPicPr>
-            <a:picLocks noChangeAspect="1"/>
-          </p:cNvPicPr>
-          <p:nvPr/>
-        </p:nvPicPr>
-        <p:blipFill>
-          <a:blip r:embed="rId3">
-            <a:extLst>
-              <a:ext uri="{28A0092B-C50C-407E-A947-70E740481C1C}">
-                <a14:useLocalDpi xmlns:a14="http://schemas.microsoft.com/office/drawing/2010/main" val="0"/>
-              </a:ext>
-            </a:extLst>
-          </a:blip>
-          <a:stretch>
-            <a:fillRect/>
-          </a:stretch>
-        </p:blipFill>
-        <p:spPr>
-          <a:xfrm>
-            <a:off x="1529024" y="1401853"/>
-            <a:ext cx="4989539" cy="4989539"/>
-          </a:xfrm>
-          <a:prstGeom prst="rect">
-            <a:avLst/>
-          </a:prstGeom>
-        </p:spPr>
-      </p:pic>
-      <p:sp>
-        <p:nvSpPr>
-          <p:cNvPr id="3" name="Espaço Reservado para Conteúdo 2"/>
-          <p:cNvSpPr>
-            <a:spLocks noGrp="1"/>
-          </p:cNvSpPr>
-          <p:nvPr>
-            <p:ph idx="1"/>
-          </p:nvPr>
-        </p:nvSpPr>
-        <p:spPr>
-          <a:xfrm>
-            <a:off x="5605669" y="2798800"/>
-            <a:ext cx="5645427" cy="1288378"/>
-          </a:xfrm>
-        </p:spPr>
-        <p:txBody>
-          <a:bodyPr>
-            <a:normAutofit fontScale="92500"/>
-          </a:bodyPr>
-          <a:lstStyle/>
-          <a:p>
-            <a:pPr marL="0" indent="0">
-              <a:buNone/>
-            </a:pPr>
-            <a:r>
-              <a:rPr lang="pt-BR" sz="2400" dirty="0">
-                <a:solidFill>
-                  <a:schemeClr val="tx1">
-                    <a:lumMod val="75000"/>
-                    <a:lumOff val="25000"/>
-                  </a:schemeClr>
-                </a:solidFill>
-                <a:latin typeface="Lemon/Milk light" panose="020B0303050302020204" pitchFamily="34" charset="0"/>
-              </a:rPr>
-              <a:t>HOJE, NO BRASIL, EXISTEM</a:t>
-            </a:r>
-          </a:p>
-          <a:p>
-            <a:pPr marL="0" indent="0">
-              <a:buNone/>
-            </a:pPr>
-            <a:r>
-              <a:rPr lang="pt-BR" sz="3200" dirty="0">
-                <a:solidFill>
-                  <a:schemeClr val="tx1">
-                    <a:lumMod val="75000"/>
-                    <a:lumOff val="25000"/>
-                  </a:schemeClr>
-                </a:solidFill>
-                <a:latin typeface="Lemon/Milk light" panose="020B0303050302020204" pitchFamily="34" charset="0"/>
-              </a:rPr>
-              <a:t>13 MILHÕES DE DESEMPREGADOS</a:t>
-            </a:r>
-          </a:p>
-        </p:txBody>
-      </p:sp>
-    </p:spTree>
-    <p:extLst>
-      <p:ext uri="{BB962C8B-B14F-4D97-AF65-F5344CB8AC3E}">
-        <p14:creationId xmlns:p14="http://schemas.microsoft.com/office/powerpoint/2010/main" val="3485168518"/>
-      </p:ext>
-    </p:extLst>
-  </p:cSld>
-  <p:clrMapOvr>
-    <a:masterClrMapping/>
-  </p:clrMapOvr>
-  <mc:AlternateContent xmlns:mc="http://schemas.openxmlformats.org/markup-compatibility/2006" xmlns:p159="http://schemas.microsoft.com/office/powerpoint/2015/09/main">
-    <mc:Choice Requires="p159">
-      <p:transition xmlns:p14="http://schemas.microsoft.com/office/powerpoint/2010/main" spd="slow" p14:dur="2000">
-        <p159:morph option="byObject"/>
-      </p:transition>
-    </mc:Choice>
-    <mc:Fallback xmlns="">
-      <p:transition spd="slow">
-        <p:fade/>
-      </p:transition>
-    </mc:Fallback>
-  </mc:AlternateContent>
-</p:sld>
-</file>
-
-<file path=ppt/slides/slide3.xml><?xml version="1.0" encoding="utf-8"?>
-<p:sld xmlns:a="http://schemas.openxmlformats.org/drawingml/2006/main" xmlns:r="http://schemas.openxmlformats.org/officeDocument/2006/relationships" xmlns:p="http://schemas.openxmlformats.org/presentationml/2006/main">
-  <p:cSld>
-    <p:spTree>
-      <p:nvGrpSpPr>
-        <p:cNvPr id="1" name=""/>
-        <p:cNvGrpSpPr/>
-        <p:nvPr/>
-      </p:nvGrpSpPr>
-      <p:grpSpPr>
-        <a:xfrm>
-          <a:off x="0" y="0"/>
-          <a:ext cx="0" cy="0"/>
-          <a:chOff x="0" y="0"/>
-          <a:chExt cx="0" cy="0"/>
-        </a:xfrm>
-      </p:grpSpPr>
-      <p:sp>
-        <p:nvSpPr>
-          <p:cNvPr id="4" name="CaixaDeTexto 3">
-            <a:extLst>
-              <a:ext uri="{FF2B5EF4-FFF2-40B4-BE49-F238E27FC236}">
-                <a16:creationId xmlns:a16="http://schemas.microsoft.com/office/drawing/2014/main" id="{39489834-BD31-45E8-B1B6-9AA3E64A460A}"/>
-              </a:ext>
-            </a:extLst>
-          </p:cNvPr>
-          <p:cNvSpPr txBox="1"/>
-          <p:nvPr/>
-        </p:nvSpPr>
-        <p:spPr>
-          <a:xfrm>
-            <a:off x="512561" y="406800"/>
             <a:ext cx="5795474" cy="461665"/>
           </a:xfrm>
           <a:prstGeom prst="rect">
@@ -5781,7 +5508,7 @@
 </p:sld>
 </file>
 
-<file path=ppt/slides/slide4.xml><?xml version="1.0" encoding="utf-8"?>
+<file path=ppt/slides/slide3.xml><?xml version="1.0" encoding="utf-8"?>
 <p:sld xmlns:a="http://schemas.openxmlformats.org/drawingml/2006/main" xmlns:r="http://schemas.openxmlformats.org/officeDocument/2006/relationships" xmlns:p="http://schemas.openxmlformats.org/presentationml/2006/main">
   <p:cSld>
     <p:spTree>
@@ -6475,7 +6202,7 @@
 </p:sld>
 </file>
 
-<file path=ppt/slides/slide5.xml><?xml version="1.0" encoding="utf-8"?>
+<file path=ppt/slides/slide4.xml><?xml version="1.0" encoding="utf-8"?>
 <p:sld xmlns:a="http://schemas.openxmlformats.org/drawingml/2006/main" xmlns:r="http://schemas.openxmlformats.org/officeDocument/2006/relationships" xmlns:p="http://schemas.openxmlformats.org/presentationml/2006/main">
   <p:cSld>
     <p:spTree>
@@ -6506,8 +6233,8 @@
         </p:nvSpPr>
         <p:spPr>
           <a:xfrm>
-            <a:off x="512560" y="406800"/>
-            <a:ext cx="5831089" cy="461665"/>
+            <a:off x="512561" y="406800"/>
+            <a:ext cx="4315360" cy="461665"/>
           </a:xfrm>
           <a:prstGeom prst="rect">
             <a:avLst/>
@@ -6530,7 +6257,7 @@
                 <a:latin typeface="Agency FB" panose="020B0503020202020204" pitchFamily="34" charset="0"/>
                 <a:ea typeface="Batang" panose="02030600000101010101" pitchFamily="18" charset="-127"/>
               </a:rPr>
-              <a:t>DIFICULDADES NAS VAGAS</a:t>
+              <a:t>CONCORRÊNCIA</a:t>
             </a:r>
           </a:p>
         </p:txBody>
@@ -6636,10 +6363,10 @@
       </p:sp>
       <p:pic>
         <p:nvPicPr>
-          <p:cNvPr id="10" name="Imagem 9">
+          <p:cNvPr id="2" name="Imagem 1">
             <a:extLst>
               <a:ext uri="{FF2B5EF4-FFF2-40B4-BE49-F238E27FC236}">
-                <a16:creationId xmlns:a16="http://schemas.microsoft.com/office/drawing/2014/main" id="{E7A975BB-EF34-45A4-8276-4DD67A0BC863}"/>
+                <a16:creationId xmlns:a16="http://schemas.microsoft.com/office/drawing/2014/main" id="{835F4F90-4E83-467F-9520-3373894190EB}"/>
               </a:ext>
             </a:extLst>
           </p:cNvPr>
@@ -6649,7 +6376,67 @@
           <p:nvPr/>
         </p:nvPicPr>
         <p:blipFill>
-          <a:blip r:embed="rId3">
+          <a:blip r:embed="rId3"/>
+          <a:stretch>
+            <a:fillRect/>
+          </a:stretch>
+        </p:blipFill>
+        <p:spPr>
+          <a:xfrm>
+            <a:off x="602012" y="1589906"/>
+            <a:ext cx="6090336" cy="4189616"/>
+          </a:xfrm>
+          <a:prstGeom prst="rect">
+            <a:avLst/>
+          </a:prstGeom>
+        </p:spPr>
+      </p:pic>
+      <p:pic>
+        <p:nvPicPr>
+          <p:cNvPr id="3" name="Imagem 2">
+            <a:extLst>
+              <a:ext uri="{FF2B5EF4-FFF2-40B4-BE49-F238E27FC236}">
+                <a16:creationId xmlns:a16="http://schemas.microsoft.com/office/drawing/2014/main" id="{5171B872-4C15-44FC-BF0D-784613CBF443}"/>
+              </a:ext>
+            </a:extLst>
+          </p:cNvPr>
+          <p:cNvPicPr>
+            <a:picLocks noChangeAspect="1"/>
+          </p:cNvPicPr>
+          <p:nvPr/>
+        </p:nvPicPr>
+        <p:blipFill>
+          <a:blip r:embed="rId4"/>
+          <a:stretch>
+            <a:fillRect/>
+          </a:stretch>
+        </p:blipFill>
+        <p:spPr>
+          <a:xfrm>
+            <a:off x="8422998" y="1589906"/>
+            <a:ext cx="2417280" cy="4288722"/>
+          </a:xfrm>
+          <a:prstGeom prst="rect">
+            <a:avLst/>
+          </a:prstGeom>
+        </p:spPr>
+      </p:pic>
+      <p:pic>
+        <p:nvPicPr>
+          <p:cNvPr id="7" name="Imagem 6">
+            <a:extLst>
+              <a:ext uri="{FF2B5EF4-FFF2-40B4-BE49-F238E27FC236}">
+                <a16:creationId xmlns:a16="http://schemas.microsoft.com/office/drawing/2014/main" id="{42901CFB-B0AF-47E1-8297-EF8445AB3BD8}"/>
+              </a:ext>
+            </a:extLst>
+          </p:cNvPr>
+          <p:cNvPicPr>
+            <a:picLocks noChangeAspect="1"/>
+          </p:cNvPicPr>
+          <p:nvPr/>
+        </p:nvPicPr>
+        <p:blipFill>
+          <a:blip r:embed="rId5" cstate="print">
             <a:extLst>
               <a:ext uri="{28A0092B-C50C-407E-A947-70E740481C1C}">
                 <a14:useLocalDpi xmlns:a14="http://schemas.microsoft.com/office/drawing/2010/main" val="0"/>
@@ -6662,86 +6449,7 @@
         </p:blipFill>
         <p:spPr>
           <a:xfrm>
-            <a:off x="602012" y="2200363"/>
-            <a:ext cx="3637860" cy="3637860"/>
-          </a:xfrm>
-          <a:prstGeom prst="rect">
-            <a:avLst/>
-          </a:prstGeom>
-        </p:spPr>
-      </p:pic>
-      <p:sp>
-        <p:nvSpPr>
-          <p:cNvPr id="11" name="CaixaDeTexto 10">
-            <a:extLst>
-              <a:ext uri="{FF2B5EF4-FFF2-40B4-BE49-F238E27FC236}">
-                <a16:creationId xmlns:a16="http://schemas.microsoft.com/office/drawing/2014/main" id="{CEAF9B2C-09A5-4433-9C68-5D57696F1A53}"/>
-              </a:ext>
-            </a:extLst>
-          </p:cNvPr>
-          <p:cNvSpPr txBox="1"/>
-          <p:nvPr/>
-        </p:nvSpPr>
-        <p:spPr>
-          <a:xfrm>
-            <a:off x="4239871" y="2593010"/>
-            <a:ext cx="4288225" cy="461665"/>
-          </a:xfrm>
-          <a:prstGeom prst="rect">
-            <a:avLst/>
-          </a:prstGeom>
-          <a:noFill/>
-        </p:spPr>
-        <p:txBody>
-          <a:bodyPr wrap="none" rtlCol="0">
-            <a:spAutoFit/>
-          </a:bodyPr>
-          <a:lstStyle/>
-          <a:p>
-            <a:r>
-              <a:rPr lang="pt-BR" sz="2400" dirty="0">
-                <a:solidFill>
-                  <a:schemeClr val="tx1">
-                    <a:lumMod val="75000"/>
-                    <a:lumOff val="25000"/>
-                  </a:schemeClr>
-                </a:solidFill>
-                <a:latin typeface="Lemon/Milk light" panose="020B0303050302020204" pitchFamily="34" charset="0"/>
-              </a:rPr>
-              <a:t>Requisitos que você tenha</a:t>
-            </a:r>
-          </a:p>
-        </p:txBody>
-      </p:sp>
-      <p:pic>
-        <p:nvPicPr>
-          <p:cNvPr id="12" name="Imagem 11">
-            <a:extLst>
-              <a:ext uri="{FF2B5EF4-FFF2-40B4-BE49-F238E27FC236}">
-                <a16:creationId xmlns:a16="http://schemas.microsoft.com/office/drawing/2014/main" id="{538ACAAA-F6FB-4DFF-A8C8-539D9C7AE354}"/>
-              </a:ext>
-            </a:extLst>
-          </p:cNvPr>
-          <p:cNvPicPr>
-            <a:picLocks noChangeAspect="1"/>
-          </p:cNvPicPr>
-          <p:nvPr/>
-        </p:nvPicPr>
-        <p:blipFill>
-          <a:blip r:embed="rId4" cstate="print">
-            <a:extLst>
-              <a:ext uri="{28A0092B-C50C-407E-A947-70E740481C1C}">
-                <a14:useLocalDpi xmlns:a14="http://schemas.microsoft.com/office/drawing/2010/main" val="0"/>
-              </a:ext>
-            </a:extLst>
-          </a:blip>
-          <a:stretch>
-            <a:fillRect/>
-          </a:stretch>
-        </p:blipFill>
-        <p:spPr>
-          <a:xfrm>
-            <a:off x="3817247" y="2718957"/>
+            <a:off x="7452786" y="3579827"/>
             <a:ext cx="209773" cy="209773"/>
           </a:xfrm>
           <a:prstGeom prst="rect">
@@ -6749,168 +6457,10 @@
           </a:prstGeom>
         </p:spPr>
       </p:pic>
-      <p:pic>
-        <p:nvPicPr>
-          <p:cNvPr id="13" name="Imagem 12">
-            <a:extLst>
-              <a:ext uri="{FF2B5EF4-FFF2-40B4-BE49-F238E27FC236}">
-                <a16:creationId xmlns:a16="http://schemas.microsoft.com/office/drawing/2014/main" id="{486DDAA9-F8F2-45AA-93EB-C84BD18B5485}"/>
-              </a:ext>
-            </a:extLst>
-          </p:cNvPr>
-          <p:cNvPicPr>
-            <a:picLocks noChangeAspect="1"/>
-          </p:cNvPicPr>
-          <p:nvPr/>
-        </p:nvPicPr>
-        <p:blipFill>
-          <a:blip r:embed="rId4" cstate="print">
-            <a:extLst>
-              <a:ext uri="{28A0092B-C50C-407E-A947-70E740481C1C}">
-                <a14:useLocalDpi xmlns:a14="http://schemas.microsoft.com/office/drawing/2010/main" val="0"/>
-              </a:ext>
-            </a:extLst>
-          </a:blip>
-          <a:stretch>
-            <a:fillRect/>
-          </a:stretch>
-        </p:blipFill>
-        <p:spPr>
-          <a:xfrm>
-            <a:off x="3817246" y="3716803"/>
-            <a:ext cx="209773" cy="209773"/>
-          </a:xfrm>
-          <a:prstGeom prst="rect">
-            <a:avLst/>
-          </a:prstGeom>
-        </p:spPr>
-      </p:pic>
-      <p:pic>
-        <p:nvPicPr>
-          <p:cNvPr id="14" name="Imagem 13">
-            <a:extLst>
-              <a:ext uri="{FF2B5EF4-FFF2-40B4-BE49-F238E27FC236}">
-                <a16:creationId xmlns:a16="http://schemas.microsoft.com/office/drawing/2014/main" id="{417953C2-D473-4430-AE27-5324BBFB57FF}"/>
-              </a:ext>
-            </a:extLst>
-          </p:cNvPr>
-          <p:cNvPicPr>
-            <a:picLocks noChangeAspect="1"/>
-          </p:cNvPicPr>
-          <p:nvPr/>
-        </p:nvPicPr>
-        <p:blipFill>
-          <a:blip r:embed="rId4" cstate="print">
-            <a:extLst>
-              <a:ext uri="{28A0092B-C50C-407E-A947-70E740481C1C}">
-                <a14:useLocalDpi xmlns:a14="http://schemas.microsoft.com/office/drawing/2010/main" val="0"/>
-              </a:ext>
-            </a:extLst>
-          </a:blip>
-          <a:stretch>
-            <a:fillRect/>
-          </a:stretch>
-        </p:blipFill>
-        <p:spPr>
-          <a:xfrm>
-            <a:off x="3817246" y="4714649"/>
-            <a:ext cx="209773" cy="209773"/>
-          </a:xfrm>
-          <a:prstGeom prst="rect">
-            <a:avLst/>
-          </a:prstGeom>
-        </p:spPr>
-      </p:pic>
-      <p:sp>
-        <p:nvSpPr>
-          <p:cNvPr id="15" name="CaixaDeTexto 14">
-            <a:extLst>
-              <a:ext uri="{FF2B5EF4-FFF2-40B4-BE49-F238E27FC236}">
-                <a16:creationId xmlns:a16="http://schemas.microsoft.com/office/drawing/2014/main" id="{A83C456C-EC88-4194-B909-D492130C9C63}"/>
-              </a:ext>
-            </a:extLst>
-          </p:cNvPr>
-          <p:cNvSpPr txBox="1"/>
-          <p:nvPr/>
-        </p:nvSpPr>
-        <p:spPr>
-          <a:xfrm>
-            <a:off x="4239871" y="3590856"/>
-            <a:ext cx="4782399" cy="461665"/>
-          </a:xfrm>
-          <a:prstGeom prst="rect">
-            <a:avLst/>
-          </a:prstGeom>
-          <a:noFill/>
-        </p:spPr>
-        <p:txBody>
-          <a:bodyPr wrap="none" rtlCol="0">
-            <a:spAutoFit/>
-          </a:bodyPr>
-          <a:lstStyle/>
-          <a:p>
-            <a:r>
-              <a:rPr lang="pt-BR" sz="2400" dirty="0">
-                <a:solidFill>
-                  <a:schemeClr val="tx1">
-                    <a:lumMod val="75000"/>
-                    <a:lumOff val="25000"/>
-                  </a:schemeClr>
-                </a:solidFill>
-                <a:latin typeface="Lemon/Milk light" panose="020B0303050302020204" pitchFamily="34" charset="0"/>
-              </a:rPr>
-              <a:t>Relacionado com o seu perfil</a:t>
-            </a:r>
-          </a:p>
-        </p:txBody>
-      </p:sp>
-      <p:sp>
-        <p:nvSpPr>
-          <p:cNvPr id="16" name="CaixaDeTexto 15">
-            <a:extLst>
-              <a:ext uri="{FF2B5EF4-FFF2-40B4-BE49-F238E27FC236}">
-                <a16:creationId xmlns:a16="http://schemas.microsoft.com/office/drawing/2014/main" id="{2991DFE1-558C-4742-8480-1337550F9EEF}"/>
-              </a:ext>
-            </a:extLst>
-          </p:cNvPr>
-          <p:cNvSpPr txBox="1"/>
-          <p:nvPr/>
-        </p:nvSpPr>
-        <p:spPr>
-          <a:xfrm>
-            <a:off x="4239871" y="4588702"/>
-            <a:ext cx="2965427" cy="461665"/>
-          </a:xfrm>
-          <a:prstGeom prst="rect">
-            <a:avLst/>
-          </a:prstGeom>
-          <a:noFill/>
-        </p:spPr>
-        <p:txBody>
-          <a:bodyPr wrap="none" rtlCol="0">
-            <a:spAutoFit/>
-          </a:bodyPr>
-          <a:lstStyle/>
-          <a:p>
-            <a:r>
-              <a:rPr lang="pt-BR" sz="2400" dirty="0">
-                <a:solidFill>
-                  <a:schemeClr val="tx1">
-                    <a:lumMod val="75000"/>
-                    <a:lumOff val="25000"/>
-                  </a:schemeClr>
-                </a:solidFill>
-                <a:latin typeface="Lemon/Milk light" panose="020B0303050302020204" pitchFamily="34" charset="0"/>
-              </a:rPr>
-              <a:t>Perto da sua casa</a:t>
-            </a:r>
-          </a:p>
-        </p:txBody>
-      </p:sp>
     </p:spTree>
     <p:extLst>
       <p:ext uri="{BB962C8B-B14F-4D97-AF65-F5344CB8AC3E}">
-        <p14:creationId xmlns:p14="http://schemas.microsoft.com/office/powerpoint/2010/main" val="740577820"/>
+        <p14:creationId xmlns:p14="http://schemas.microsoft.com/office/powerpoint/2010/main" val="3022064786"/>
       </p:ext>
     </p:extLst>
   </p:cSld>
@@ -6963,178 +6513,7 @@
                                           </p:stCondLst>
                                         </p:cTn>
                                         <p:tgtEl>
-                                          <p:spTgt spid="12"/>
-                                        </p:tgtEl>
-                                        <p:attrNameLst>
-                                          <p:attrName>style.visibility</p:attrName>
-                                        </p:attrNameLst>
-                                      </p:cBhvr>
-                                      <p:to>
-                                        <p:strVal val="visible"/>
-                                      </p:to>
-                                    </p:set>
-                                  </p:childTnLst>
-                                </p:cTn>
-                              </p:par>
-                              <p:par>
-                                <p:cTn id="7" presetID="1" presetClass="entr" presetSubtype="0" fill="hold" grpId="0" nodeType="withEffect">
-                                  <p:stCondLst>
-                                    <p:cond delay="0"/>
-                                  </p:stCondLst>
-                                  <p:childTnLst>
-                                    <p:set>
-                                      <p:cBhvr>
-                                        <p:cTn id="8" dur="1" fill="hold">
-                                          <p:stCondLst>
-                                            <p:cond delay="0"/>
-                                          </p:stCondLst>
-                                        </p:cTn>
-                                        <p:tgtEl>
-                                          <p:spTgt spid="11"/>
-                                        </p:tgtEl>
-                                        <p:attrNameLst>
-                                          <p:attrName>style.visibility</p:attrName>
-                                        </p:attrNameLst>
-                                      </p:cBhvr>
-                                      <p:to>
-                                        <p:strVal val="visible"/>
-                                      </p:to>
-                                    </p:set>
-                                  </p:childTnLst>
-                                </p:cTn>
-                              </p:par>
-                            </p:childTnLst>
-                          </p:cTn>
-                        </p:par>
-                      </p:childTnLst>
-                    </p:cTn>
-                  </p:par>
-                  <p:par>
-                    <p:cTn id="9" fill="hold">
-                      <p:stCondLst>
-                        <p:cond delay="indefinite"/>
-                      </p:stCondLst>
-                      <p:childTnLst>
-                        <p:par>
-                          <p:cTn id="10" fill="hold">
-                            <p:stCondLst>
-                              <p:cond delay="0"/>
-                            </p:stCondLst>
-                            <p:childTnLst>
-                              <p:par>
-                                <p:cTn id="11" presetID="1" presetClass="entr" presetSubtype="0" fill="hold" nodeType="clickEffect">
-                                  <p:stCondLst>
-                                    <p:cond delay="0"/>
-                                  </p:stCondLst>
-                                  <p:childTnLst>
-                                    <p:set>
-                                      <p:cBhvr>
-                                        <p:cTn id="12" dur="1" fill="hold">
-                                          <p:stCondLst>
-                                            <p:cond delay="0"/>
-                                          </p:stCondLst>
-                                        </p:cTn>
-                                        <p:tgtEl>
-                                          <p:spTgt spid="13"/>
-                                        </p:tgtEl>
-                                        <p:attrNameLst>
-                                          <p:attrName>style.visibility</p:attrName>
-                                        </p:attrNameLst>
-                                      </p:cBhvr>
-                                      <p:to>
-                                        <p:strVal val="visible"/>
-                                      </p:to>
-                                    </p:set>
-                                  </p:childTnLst>
-                                </p:cTn>
-                              </p:par>
-                              <p:par>
-                                <p:cTn id="13" presetID="1" presetClass="entr" presetSubtype="0" fill="hold" grpId="0" nodeType="withEffect">
-                                  <p:stCondLst>
-                                    <p:cond delay="0"/>
-                                  </p:stCondLst>
-                                  <p:childTnLst>
-                                    <p:set>
-                                      <p:cBhvr>
-                                        <p:cTn id="14" dur="1" fill="hold">
-                                          <p:stCondLst>
-                                            <p:cond delay="0"/>
-                                          </p:stCondLst>
-                                        </p:cTn>
-                                        <p:tgtEl>
-                                          <p:spTgt spid="15"/>
-                                        </p:tgtEl>
-                                        <p:attrNameLst>
-                                          <p:attrName>style.visibility</p:attrName>
-                                        </p:attrNameLst>
-                                      </p:cBhvr>
-                                      <p:to>
-                                        <p:strVal val="visible"/>
-                                      </p:to>
-                                    </p:set>
-                                  </p:childTnLst>
-                                </p:cTn>
-                              </p:par>
-                            </p:childTnLst>
-                          </p:cTn>
-                        </p:par>
-                      </p:childTnLst>
-                    </p:cTn>
-                  </p:par>
-                  <p:par>
-                    <p:cTn id="15" fill="hold">
-                      <p:stCondLst>
-                        <p:cond delay="indefinite"/>
-                      </p:stCondLst>
-                      <p:childTnLst>
-                        <p:par>
-                          <p:cTn id="16" fill="hold">
-                            <p:stCondLst>
-                              <p:cond delay="0"/>
-                            </p:stCondLst>
-                            <p:childTnLst>
-                              <p:par>
-                                <p:cTn id="17" presetID="1" presetClass="entr" presetSubtype="0" fill="hold" nodeType="clickEffect">
-                                  <p:stCondLst>
-                                    <p:cond delay="0"/>
-                                  </p:stCondLst>
-                                  <p:childTnLst>
-                                    <p:set>
-                                      <p:cBhvr>
-                                        <p:cTn id="18" dur="1" fill="hold">
-                                          <p:stCondLst>
-                                            <p:cond delay="0"/>
-                                          </p:stCondLst>
-                                        </p:cTn>
-                                        <p:tgtEl>
-                                          <p:spTgt spid="14"/>
-                                        </p:tgtEl>
-                                        <p:attrNameLst>
-                                          <p:attrName>style.visibility</p:attrName>
-                                        </p:attrNameLst>
-                                      </p:cBhvr>
-                                      <p:to>
-                                        <p:strVal val="visible"/>
-                                      </p:to>
-                                    </p:set>
-                                  </p:childTnLst>
-                                </p:cTn>
-                              </p:par>
-                              <p:par>
-                                <p:cTn id="19" presetID="1" presetClass="entr" presetSubtype="0" fill="hold" grpId="0" nodeType="withEffect">
-                                  <p:stCondLst>
-                                    <p:cond delay="0"/>
-                                  </p:stCondLst>
-                                  <p:childTnLst>
-                                    <p:set>
-                                      <p:cBhvr>
-                                        <p:cTn id="20" dur="1" fill="hold">
-                                          <p:stCondLst>
-                                            <p:cond delay="0"/>
-                                          </p:stCondLst>
-                                        </p:cTn>
-                                        <p:tgtEl>
-                                          <p:spTgt spid="16"/>
+                                          <p:spTgt spid="7"/>
                                         </p:tgtEl>
                                         <p:attrNameLst>
                                           <p:attrName>style.visibility</p:attrName>
@@ -7174,16 +6553,11 @@
         </p:cTn>
       </p:par>
     </p:tnLst>
-    <p:bldLst>
-      <p:bldP spid="11" grpId="0"/>
-      <p:bldP spid="15" grpId="0"/>
-      <p:bldP spid="16" grpId="0"/>
-    </p:bldLst>
   </p:timing>
 </p:sld>
 </file>
 
-<file path=ppt/slides/slide6.xml><?xml version="1.0" encoding="utf-8"?>
+<file path=ppt/slides/slide5.xml><?xml version="1.0" encoding="utf-8"?>
 <p:sld xmlns:a="http://schemas.openxmlformats.org/drawingml/2006/main" xmlns:r="http://schemas.openxmlformats.org/officeDocument/2006/relationships" xmlns:p="http://schemas.openxmlformats.org/presentationml/2006/main">
   <p:cSld>
     <p:spTree>
@@ -7238,7 +6612,7 @@
                 <a:latin typeface="Agency FB" panose="020B0503020202020204" pitchFamily="34" charset="0"/>
                 <a:ea typeface="Batang" panose="02030600000101010101" pitchFamily="18" charset="-127"/>
               </a:rPr>
-              <a:t>CONCORRÊNCIA</a:t>
+              <a:t>MONETIZAÇÃO</a:t>
             </a:r>
           </a:p>
         </p:txBody>
@@ -7342,40 +6716,10 @@
           </a:p>
         </p:txBody>
       </p:sp>
-      <p:pic>
-        <p:nvPicPr>
-          <p:cNvPr id="2" name="Imagem 1">
-            <a:extLst>
-              <a:ext uri="{FF2B5EF4-FFF2-40B4-BE49-F238E27FC236}">
-                <a16:creationId xmlns:a16="http://schemas.microsoft.com/office/drawing/2014/main" id="{835F4F90-4E83-467F-9520-3373894190EB}"/>
-              </a:ext>
-            </a:extLst>
-          </p:cNvPr>
-          <p:cNvPicPr>
-            <a:picLocks noChangeAspect="1"/>
-          </p:cNvPicPr>
-          <p:nvPr/>
-        </p:nvPicPr>
-        <p:blipFill>
-          <a:blip r:embed="rId3"/>
-          <a:stretch>
-            <a:fillRect/>
-          </a:stretch>
-        </p:blipFill>
-        <p:spPr>
-          <a:xfrm>
-            <a:off x="602012" y="1929375"/>
-            <a:ext cx="5346887" cy="3678188"/>
-          </a:xfrm>
-          <a:prstGeom prst="rect">
-            <a:avLst/>
-          </a:prstGeom>
-        </p:spPr>
-      </p:pic>
     </p:spTree>
     <p:extLst>
       <p:ext uri="{BB962C8B-B14F-4D97-AF65-F5344CB8AC3E}">
-        <p14:creationId xmlns:p14="http://schemas.microsoft.com/office/powerpoint/2010/main" val="3022064786"/>
+        <p14:creationId xmlns:p14="http://schemas.microsoft.com/office/powerpoint/2010/main" val="941697809"/>
       </p:ext>
     </p:extLst>
   </p:cSld>
@@ -7397,227 +6741,7 @@
 </p:sld>
 </file>
 
-<file path=ppt/slides/slide7.xml><?xml version="1.0" encoding="utf-8"?>
-<p:sld xmlns:a="http://schemas.openxmlformats.org/drawingml/2006/main" xmlns:r="http://schemas.openxmlformats.org/officeDocument/2006/relationships" xmlns:p="http://schemas.openxmlformats.org/presentationml/2006/main">
-  <p:cSld>
-    <p:spTree>
-      <p:nvGrpSpPr>
-        <p:cNvPr id="1" name=""/>
-        <p:cNvGrpSpPr/>
-        <p:nvPr/>
-      </p:nvGrpSpPr>
-      <p:grpSpPr>
-        <a:xfrm>
-          <a:off x="0" y="0"/>
-          <a:ext cx="0" cy="0"/>
-          <a:chOff x="0" y="0"/>
-          <a:chExt cx="0" cy="0"/>
-        </a:xfrm>
-      </p:grpSpPr>
-      <p:sp>
-        <p:nvSpPr>
-          <p:cNvPr id="4" name="CaixaDeTexto 3">
-            <a:extLst>
-              <a:ext uri="{FF2B5EF4-FFF2-40B4-BE49-F238E27FC236}">
-                <a16:creationId xmlns:a16="http://schemas.microsoft.com/office/drawing/2014/main" id="{39489834-BD31-45E8-B1B6-9AA3E64A460A}"/>
-              </a:ext>
-            </a:extLst>
-          </p:cNvPr>
-          <p:cNvSpPr txBox="1"/>
-          <p:nvPr/>
-        </p:nvSpPr>
-        <p:spPr>
-          <a:xfrm>
-            <a:off x="512561" y="406800"/>
-            <a:ext cx="4315360" cy="461665"/>
-          </a:xfrm>
-          <a:prstGeom prst="rect">
-            <a:avLst/>
-          </a:prstGeom>
-          <a:noFill/>
-        </p:spPr>
-        <p:txBody>
-          <a:bodyPr wrap="square" rtlCol="0">
-            <a:spAutoFit/>
-          </a:bodyPr>
-          <a:lstStyle/>
-          <a:p>
-            <a:r>
-              <a:rPr lang="pt-BR" sz="2400" spc="600" dirty="0">
-                <a:solidFill>
-                  <a:schemeClr val="bg1">
-                    <a:lumMod val="65000"/>
-                  </a:schemeClr>
-                </a:solidFill>
-                <a:latin typeface="Agency FB" panose="020B0503020202020204" pitchFamily="34" charset="0"/>
-                <a:ea typeface="Batang" panose="02030600000101010101" pitchFamily="18" charset="-127"/>
-              </a:rPr>
-              <a:t>CONCORRÊNCIA</a:t>
-            </a:r>
-          </a:p>
-        </p:txBody>
-      </p:sp>
-      <p:pic>
-        <p:nvPicPr>
-          <p:cNvPr id="5" name="Imagem 4">
-            <a:extLst>
-              <a:ext uri="{FF2B5EF4-FFF2-40B4-BE49-F238E27FC236}">
-                <a16:creationId xmlns:a16="http://schemas.microsoft.com/office/drawing/2014/main" id="{BB0A6787-3AD8-46A0-920A-BEC272CD647C}"/>
-              </a:ext>
-            </a:extLst>
-          </p:cNvPr>
-          <p:cNvPicPr>
-            <a:picLocks noChangeAspect="1"/>
-          </p:cNvPicPr>
-          <p:nvPr/>
-        </p:nvPicPr>
-        <p:blipFill>
-          <a:blip r:embed="rId2" cstate="print">
-            <a:extLst>
-              <a:ext uri="{28A0092B-C50C-407E-A947-70E740481C1C}">
-                <a14:useLocalDpi xmlns:a14="http://schemas.microsoft.com/office/drawing/2010/main" val="0"/>
-              </a:ext>
-            </a:extLst>
-          </a:blip>
-          <a:stretch>
-            <a:fillRect/>
-          </a:stretch>
-        </p:blipFill>
-        <p:spPr>
-          <a:xfrm>
-            <a:off x="11703860" y="6391392"/>
-            <a:ext cx="366488" cy="366488"/>
-          </a:xfrm>
-          <a:prstGeom prst="rect">
-            <a:avLst/>
-          </a:prstGeom>
-        </p:spPr>
-      </p:pic>
-      <p:sp>
-        <p:nvSpPr>
-          <p:cNvPr id="6" name="Arredondar Retângulo em um Canto Diagonal 53">
-            <a:extLst>
-              <a:ext uri="{FF2B5EF4-FFF2-40B4-BE49-F238E27FC236}">
-                <a16:creationId xmlns:a16="http://schemas.microsoft.com/office/drawing/2014/main" id="{737288A4-C4D9-42D1-AFEE-69604EB63A24}"/>
-              </a:ext>
-            </a:extLst>
-          </p:cNvPr>
-          <p:cNvSpPr/>
-          <p:nvPr/>
-        </p:nvSpPr>
-        <p:spPr>
-          <a:xfrm flipV="1">
-            <a:off x="602012" y="1019777"/>
-            <a:ext cx="10808110" cy="36000"/>
-          </a:xfrm>
-          <a:prstGeom prst="round2DiagRect">
-            <a:avLst/>
-          </a:prstGeom>
-          <a:gradFill flip="none" rotWithShape="1">
-            <a:gsLst>
-              <a:gs pos="0">
-                <a:srgbClr val="6C5CE7"/>
-              </a:gs>
-              <a:gs pos="100000">
-                <a:srgbClr val="81ECEC"/>
-              </a:gs>
-            </a:gsLst>
-            <a:path path="circle">
-              <a:fillToRect l="100000" t="100000"/>
-            </a:path>
-            <a:tileRect r="-100000" b="-100000"/>
-          </a:gradFill>
-          <a:ln>
-            <a:noFill/>
-          </a:ln>
-        </p:spPr>
-        <p:style>
-          <a:lnRef idx="2">
-            <a:schemeClr val="accent1">
-              <a:shade val="50000"/>
-            </a:schemeClr>
-          </a:lnRef>
-          <a:fillRef idx="1">
-            <a:schemeClr val="accent1"/>
-          </a:fillRef>
-          <a:effectRef idx="0">
-            <a:schemeClr val="accent1"/>
-          </a:effectRef>
-          <a:fontRef idx="minor">
-            <a:schemeClr val="lt1"/>
-          </a:fontRef>
-        </p:style>
-        <p:txBody>
-          <a:bodyPr rtlCol="0" anchor="ctr"/>
-          <a:lstStyle/>
-          <a:p>
-            <a:pPr algn="ctr"/>
-            <a:endParaRPr lang="pt-BR" dirty="0"/>
-          </a:p>
-        </p:txBody>
-      </p:sp>
-      <p:pic>
-        <p:nvPicPr>
-          <p:cNvPr id="7" name="Imagem 6" descr="Tela de computador com texto preto sobre fundo branco&#10;&#10;Descrição gerada automaticamente">
-            <a:extLst>
-              <a:ext uri="{FF2B5EF4-FFF2-40B4-BE49-F238E27FC236}">
-                <a16:creationId xmlns:a16="http://schemas.microsoft.com/office/drawing/2014/main" id="{87397CD0-0397-4E06-BBBC-24ADA3296C28}"/>
-              </a:ext>
-            </a:extLst>
-          </p:cNvPr>
-          <p:cNvPicPr>
-            <a:picLocks noChangeAspect="1"/>
-          </p:cNvPicPr>
-          <p:nvPr/>
-        </p:nvPicPr>
-        <p:blipFill>
-          <a:blip r:embed="rId3">
-            <a:extLst>
-              <a:ext uri="{28A0092B-C50C-407E-A947-70E740481C1C}">
-                <a14:useLocalDpi xmlns:a14="http://schemas.microsoft.com/office/drawing/2010/main" val="0"/>
-              </a:ext>
-            </a:extLst>
-          </a:blip>
-          <a:stretch>
-            <a:fillRect/>
-          </a:stretch>
-        </p:blipFill>
-        <p:spPr>
-          <a:xfrm>
-            <a:off x="2544417" y="1207089"/>
-            <a:ext cx="7103165" cy="5327373"/>
-          </a:xfrm>
-          <a:prstGeom prst="rect">
-            <a:avLst/>
-          </a:prstGeom>
-        </p:spPr>
-      </p:pic>
-    </p:spTree>
-    <p:extLst>
-      <p:ext uri="{BB962C8B-B14F-4D97-AF65-F5344CB8AC3E}">
-        <p14:creationId xmlns:p14="http://schemas.microsoft.com/office/powerpoint/2010/main" val="2082824830"/>
-      </p:ext>
-    </p:extLst>
-  </p:cSld>
-  <p:clrMapOvr>
-    <a:masterClrMapping/>
-  </p:clrMapOvr>
-  <mc:AlternateContent xmlns:mc="http://schemas.openxmlformats.org/markup-compatibility/2006" xmlns:p159="http://schemas.microsoft.com/office/powerpoint/2015/09/main">
-    <mc:Choice Requires="p159">
-      <p:transition xmlns:p14="http://schemas.microsoft.com/office/powerpoint/2010/main" spd="slow" p14:dur="2000">
-        <p159:morph option="byObject"/>
-      </p:transition>
-    </mc:Choice>
-    <mc:Fallback xmlns="">
-      <p:transition spd="slow">
-        <p:fade/>
-      </p:transition>
-    </mc:Fallback>
-  </mc:AlternateContent>
-</p:sld>
-</file>
-
-<file path=ppt/slides/slide8.xml><?xml version="1.0" encoding="utf-8"?>
+<file path=ppt/slides/slide6.xml><?xml version="1.0" encoding="utf-8"?>
 <p:sld xmlns:a="http://schemas.openxmlformats.org/drawingml/2006/main" xmlns:r="http://schemas.openxmlformats.org/officeDocument/2006/relationships" xmlns:p="http://schemas.openxmlformats.org/presentationml/2006/main">
   <p:cSld>
     <p:bg>

</xml_diff>